<commit_message>
data in de lijsten en extra buttons
</commit_message>
<xml_diff>
--- a/Fleetmanager.pptx
+++ b/Fleetmanager.pptx
@@ -5,10 +5,10 @@
     <p:sldMasterId id="2147483666" r:id="rId4"/>
   </p:sldMasterIdLst>
   <p:notesMasterIdLst>
-    <p:notesMasterId r:id="rId13"/>
+    <p:notesMasterId r:id="rId14"/>
   </p:notesMasterIdLst>
   <p:handoutMasterIdLst>
-    <p:handoutMasterId r:id="rId14"/>
+    <p:handoutMasterId r:id="rId15"/>
   </p:handoutMasterIdLst>
   <p:sldIdLst>
     <p:sldId id="256" r:id="rId5"/>
@@ -17,8 +17,9 @@
     <p:sldId id="266" r:id="rId8"/>
     <p:sldId id="289" r:id="rId9"/>
     <p:sldId id="278" r:id="rId10"/>
-    <p:sldId id="276" r:id="rId11"/>
-    <p:sldId id="295" r:id="rId12"/>
+    <p:sldId id="296" r:id="rId11"/>
+    <p:sldId id="276" r:id="rId12"/>
+    <p:sldId id="295" r:id="rId13"/>
   </p:sldIdLst>
   <p:sldSz cx="12192000" cy="6858000"/>
   <p:notesSz cx="6858000" cy="9144000"/>
@@ -151,6 +152,225 @@
 </p:cmAuthorLst>
 </file>
 
+<file path=ppt/changesInfos/changesInfo1.xml><?xml version="1.0" encoding="utf-8"?>
+<pc:chgInfo xmlns:a="http://schemas.openxmlformats.org/drawingml/2006/main" xmlns:r="http://schemas.openxmlformats.org/officeDocument/2006/relationships" xmlns:ac="http://schemas.microsoft.com/office/drawing/2013/main/command" xmlns:pc="http://schemas.microsoft.com/office/powerpoint/2013/main/command">
+  <pc:docChgLst>
+    <pc:chgData name="Andy Lauwers" userId="7be6688b-968b-49c4-9bdf-941ba38dd5c5" providerId="ADAL" clId="{7CABCE64-8FF2-47BE-BDED-1FEAD6D05DA6}"/>
+    <pc:docChg chg="undo custSel addSld modSld">
+      <pc:chgData name="Andy Lauwers" userId="7be6688b-968b-49c4-9bdf-941ba38dd5c5" providerId="ADAL" clId="{7CABCE64-8FF2-47BE-BDED-1FEAD6D05DA6}" dt="2023-11-21T20:20:27.336" v="401"/>
+      <pc:docMkLst>
+        <pc:docMk/>
+      </pc:docMkLst>
+      <pc:sldChg chg="addSp delSp modSp mod">
+        <pc:chgData name="Andy Lauwers" userId="7be6688b-968b-49c4-9bdf-941ba38dd5c5" providerId="ADAL" clId="{7CABCE64-8FF2-47BE-BDED-1FEAD6D05DA6}" dt="2023-11-21T16:31:57.810" v="139" actId="1076"/>
+        <pc:sldMkLst>
+          <pc:docMk/>
+          <pc:sldMk cId="2069393026" sldId="278"/>
+        </pc:sldMkLst>
+        <pc:spChg chg="mod">
+          <ac:chgData name="Andy Lauwers" userId="7be6688b-968b-49c4-9bdf-941ba38dd5c5" providerId="ADAL" clId="{7CABCE64-8FF2-47BE-BDED-1FEAD6D05DA6}" dt="2023-11-21T16:27:01.920" v="70" actId="1076"/>
+          <ac:spMkLst>
+            <pc:docMk/>
+            <pc:sldMk cId="2069393026" sldId="278"/>
+            <ac:spMk id="2" creationId="{8A4E0A63-A388-49B1-A04E-27CE9BD622EF}"/>
+          </ac:spMkLst>
+        </pc:spChg>
+        <pc:spChg chg="del">
+          <ac:chgData name="Andy Lauwers" userId="7be6688b-968b-49c4-9bdf-941ba38dd5c5" providerId="ADAL" clId="{7CABCE64-8FF2-47BE-BDED-1FEAD6D05DA6}" dt="2023-11-21T16:21:28.437" v="0" actId="478"/>
+          <ac:spMkLst>
+            <pc:docMk/>
+            <pc:sldMk cId="2069393026" sldId="278"/>
+            <ac:spMk id="5" creationId="{06E82690-B145-4D4F-B2D1-0B2A8C50FD71}"/>
+          </ac:spMkLst>
+        </pc:spChg>
+        <pc:spChg chg="del">
+          <ac:chgData name="Andy Lauwers" userId="7be6688b-968b-49c4-9bdf-941ba38dd5c5" providerId="ADAL" clId="{7CABCE64-8FF2-47BE-BDED-1FEAD6D05DA6}" dt="2023-11-21T16:21:28.437" v="0" actId="478"/>
+          <ac:spMkLst>
+            <pc:docMk/>
+            <pc:sldMk cId="2069393026" sldId="278"/>
+            <ac:spMk id="6" creationId="{7640DF9D-0C9E-4C5D-9635-6B4DE10CCEE5}"/>
+          </ac:spMkLst>
+        </pc:spChg>
+        <pc:spChg chg="del">
+          <ac:chgData name="Andy Lauwers" userId="7be6688b-968b-49c4-9bdf-941ba38dd5c5" providerId="ADAL" clId="{7CABCE64-8FF2-47BE-BDED-1FEAD6D05DA6}" dt="2023-11-21T16:21:28.437" v="0" actId="478"/>
+          <ac:spMkLst>
+            <pc:docMk/>
+            <pc:sldMk cId="2069393026" sldId="278"/>
+            <ac:spMk id="7" creationId="{40297407-CE4E-4284-879D-AEC395713625}"/>
+          </ac:spMkLst>
+        </pc:spChg>
+        <pc:spChg chg="del">
+          <ac:chgData name="Andy Lauwers" userId="7be6688b-968b-49c4-9bdf-941ba38dd5c5" providerId="ADAL" clId="{7CABCE64-8FF2-47BE-BDED-1FEAD6D05DA6}" dt="2023-11-21T16:21:28.437" v="0" actId="478"/>
+          <ac:spMkLst>
+            <pc:docMk/>
+            <pc:sldMk cId="2069393026" sldId="278"/>
+            <ac:spMk id="8" creationId="{F5C3A7BE-F7FC-4942-A31A-491A8A806103}"/>
+          </ac:spMkLst>
+        </pc:spChg>
+        <pc:spChg chg="del">
+          <ac:chgData name="Andy Lauwers" userId="7be6688b-968b-49c4-9bdf-941ba38dd5c5" providerId="ADAL" clId="{7CABCE64-8FF2-47BE-BDED-1FEAD6D05DA6}" dt="2023-11-21T16:21:28.437" v="0" actId="478"/>
+          <ac:spMkLst>
+            <pc:docMk/>
+            <pc:sldMk cId="2069393026" sldId="278"/>
+            <ac:spMk id="9" creationId="{95CCE699-03D1-4642-B46A-B14EF17DA183}"/>
+          </ac:spMkLst>
+        </pc:spChg>
+        <pc:spChg chg="del">
+          <ac:chgData name="Andy Lauwers" userId="7be6688b-968b-49c4-9bdf-941ba38dd5c5" providerId="ADAL" clId="{7CABCE64-8FF2-47BE-BDED-1FEAD6D05DA6}" dt="2023-11-21T16:21:28.437" v="0" actId="478"/>
+          <ac:spMkLst>
+            <pc:docMk/>
+            <pc:sldMk cId="2069393026" sldId="278"/>
+            <ac:spMk id="10" creationId="{BC1DF189-6F2F-4C21-88CC-C82D3D0D147B}"/>
+          </ac:spMkLst>
+        </pc:spChg>
+        <pc:spChg chg="add del mod">
+          <ac:chgData name="Andy Lauwers" userId="7be6688b-968b-49c4-9bdf-941ba38dd5c5" providerId="ADAL" clId="{7CABCE64-8FF2-47BE-BDED-1FEAD6D05DA6}" dt="2023-11-21T16:21:30.873" v="4" actId="478"/>
+          <ac:spMkLst>
+            <pc:docMk/>
+            <pc:sldMk cId="2069393026" sldId="278"/>
+            <ac:spMk id="12" creationId="{8DF4E706-1731-8285-0DB7-EC7A8BED0BB2}"/>
+          </ac:spMkLst>
+        </pc:spChg>
+        <pc:spChg chg="add del mod">
+          <ac:chgData name="Andy Lauwers" userId="7be6688b-968b-49c4-9bdf-941ba38dd5c5" providerId="ADAL" clId="{7CABCE64-8FF2-47BE-BDED-1FEAD6D05DA6}" dt="2023-11-21T16:21:30.873" v="4" actId="478"/>
+          <ac:spMkLst>
+            <pc:docMk/>
+            <pc:sldMk cId="2069393026" sldId="278"/>
+            <ac:spMk id="14" creationId="{A487A0DE-2072-140F-0D60-19A1B9A601CE}"/>
+          </ac:spMkLst>
+        </pc:spChg>
+        <pc:spChg chg="add del mod">
+          <ac:chgData name="Andy Lauwers" userId="7be6688b-968b-49c4-9bdf-941ba38dd5c5" providerId="ADAL" clId="{7CABCE64-8FF2-47BE-BDED-1FEAD6D05DA6}" dt="2023-11-21T16:21:30.873" v="4" actId="478"/>
+          <ac:spMkLst>
+            <pc:docMk/>
+            <pc:sldMk cId="2069393026" sldId="278"/>
+            <ac:spMk id="16" creationId="{D58CC6B7-211E-1F03-8BEB-E3CE3D24E535}"/>
+          </ac:spMkLst>
+        </pc:spChg>
+        <pc:spChg chg="add del mod">
+          <ac:chgData name="Andy Lauwers" userId="7be6688b-968b-49c4-9bdf-941ba38dd5c5" providerId="ADAL" clId="{7CABCE64-8FF2-47BE-BDED-1FEAD6D05DA6}" dt="2023-11-21T16:21:30.873" v="4" actId="478"/>
+          <ac:spMkLst>
+            <pc:docMk/>
+            <pc:sldMk cId="2069393026" sldId="278"/>
+            <ac:spMk id="18" creationId="{0B4142E3-5F7A-D161-0D7E-2A0808DCF2E7}"/>
+          </ac:spMkLst>
+        </pc:spChg>
+        <pc:spChg chg="add del mod">
+          <ac:chgData name="Andy Lauwers" userId="7be6688b-968b-49c4-9bdf-941ba38dd5c5" providerId="ADAL" clId="{7CABCE64-8FF2-47BE-BDED-1FEAD6D05DA6}" dt="2023-11-21T16:21:30.873" v="4" actId="478"/>
+          <ac:spMkLst>
+            <pc:docMk/>
+            <pc:sldMk cId="2069393026" sldId="278"/>
+            <ac:spMk id="20" creationId="{6C587DE5-444E-CC57-0BD2-6553D5743AE4}"/>
+          </ac:spMkLst>
+        </pc:spChg>
+        <pc:spChg chg="add del mod">
+          <ac:chgData name="Andy Lauwers" userId="7be6688b-968b-49c4-9bdf-941ba38dd5c5" providerId="ADAL" clId="{7CABCE64-8FF2-47BE-BDED-1FEAD6D05DA6}" dt="2023-11-21T16:21:30.873" v="4" actId="478"/>
+          <ac:spMkLst>
+            <pc:docMk/>
+            <pc:sldMk cId="2069393026" sldId="278"/>
+            <ac:spMk id="22" creationId="{30573A7F-F08F-B873-F066-E455C7FEA44F}"/>
+          </ac:spMkLst>
+        </pc:spChg>
+        <pc:picChg chg="add mod">
+          <ac:chgData name="Andy Lauwers" userId="7be6688b-968b-49c4-9bdf-941ba38dd5c5" providerId="ADAL" clId="{7CABCE64-8FF2-47BE-BDED-1FEAD6D05DA6}" dt="2023-11-21T16:31:41.262" v="138" actId="1076"/>
+          <ac:picMkLst>
+            <pc:docMk/>
+            <pc:sldMk cId="2069393026" sldId="278"/>
+            <ac:picMk id="24" creationId="{FDAE47D6-4D84-7AC5-04EA-F74F0580CBC2}"/>
+          </ac:picMkLst>
+        </pc:picChg>
+        <pc:picChg chg="add mod ord">
+          <ac:chgData name="Andy Lauwers" userId="7be6688b-968b-49c4-9bdf-941ba38dd5c5" providerId="ADAL" clId="{7CABCE64-8FF2-47BE-BDED-1FEAD6D05DA6}" dt="2023-11-21T16:31:28.687" v="136" actId="1076"/>
+          <ac:picMkLst>
+            <pc:docMk/>
+            <pc:sldMk cId="2069393026" sldId="278"/>
+            <ac:picMk id="26" creationId="{39A2A588-D1A0-B1D5-885C-B131B230C2A9}"/>
+          </ac:picMkLst>
+        </pc:picChg>
+        <pc:picChg chg="add mod ord">
+          <ac:chgData name="Andy Lauwers" userId="7be6688b-968b-49c4-9bdf-941ba38dd5c5" providerId="ADAL" clId="{7CABCE64-8FF2-47BE-BDED-1FEAD6D05DA6}" dt="2023-11-21T16:30:20.512" v="129" actId="1037"/>
+          <ac:picMkLst>
+            <pc:docMk/>
+            <pc:sldMk cId="2069393026" sldId="278"/>
+            <ac:picMk id="28" creationId="{2487D7EF-2234-73EA-7432-979E8BB95317}"/>
+          </ac:picMkLst>
+        </pc:picChg>
+        <pc:picChg chg="add mod">
+          <ac:chgData name="Andy Lauwers" userId="7be6688b-968b-49c4-9bdf-941ba38dd5c5" providerId="ADAL" clId="{7CABCE64-8FF2-47BE-BDED-1FEAD6D05DA6}" dt="2023-11-21T16:31:57.810" v="139" actId="1076"/>
+          <ac:picMkLst>
+            <pc:docMk/>
+            <pc:sldMk cId="2069393026" sldId="278"/>
+            <ac:picMk id="30" creationId="{5ACB98AD-DF61-F169-376E-311211CCA5A2}"/>
+          </ac:picMkLst>
+        </pc:picChg>
+      </pc:sldChg>
+      <pc:sldChg chg="modSp mod">
+        <pc:chgData name="Andy Lauwers" userId="7be6688b-968b-49c4-9bdf-941ba38dd5c5" providerId="ADAL" clId="{7CABCE64-8FF2-47BE-BDED-1FEAD6D05DA6}" dt="2023-11-21T20:20:27.336" v="401"/>
+        <pc:sldMkLst>
+          <pc:docMk/>
+          <pc:sldMk cId="1844941827" sldId="289"/>
+        </pc:sldMkLst>
+        <pc:spChg chg="mod">
+          <ac:chgData name="Andy Lauwers" userId="7be6688b-968b-49c4-9bdf-941ba38dd5c5" providerId="ADAL" clId="{7CABCE64-8FF2-47BE-BDED-1FEAD6D05DA6}" dt="2023-11-21T20:20:27.336" v="401"/>
+          <ac:spMkLst>
+            <pc:docMk/>
+            <pc:sldMk cId="1844941827" sldId="289"/>
+            <ac:spMk id="4" creationId="{AC1C80FB-53F9-42EE-B1E6-D0F998EC5DFA}"/>
+          </ac:spMkLst>
+        </pc:spChg>
+      </pc:sldChg>
+      <pc:sldChg chg="addSp modSp add mod">
+        <pc:chgData name="Andy Lauwers" userId="7be6688b-968b-49c4-9bdf-941ba38dd5c5" providerId="ADAL" clId="{7CABCE64-8FF2-47BE-BDED-1FEAD6D05DA6}" dt="2023-11-21T20:14:39.033" v="249" actId="208"/>
+        <pc:sldMkLst>
+          <pc:docMk/>
+          <pc:sldMk cId="3902976026" sldId="296"/>
+        </pc:sldMkLst>
+        <pc:spChg chg="mod">
+          <ac:chgData name="Andy Lauwers" userId="7be6688b-968b-49c4-9bdf-941ba38dd5c5" providerId="ADAL" clId="{7CABCE64-8FF2-47BE-BDED-1FEAD6D05DA6}" dt="2023-11-21T16:27:21.474" v="72" actId="1076"/>
+          <ac:spMkLst>
+            <pc:docMk/>
+            <pc:sldMk cId="3902976026" sldId="296"/>
+            <ac:spMk id="2" creationId="{8A4E0A63-A388-49B1-A04E-27CE9BD622EF}"/>
+          </ac:spMkLst>
+        </pc:spChg>
+        <pc:picChg chg="add mod modCrop">
+          <ac:chgData name="Andy Lauwers" userId="7be6688b-968b-49c4-9bdf-941ba38dd5c5" providerId="ADAL" clId="{7CABCE64-8FF2-47BE-BDED-1FEAD6D05DA6}" dt="2023-11-21T18:35:58.540" v="229" actId="1076"/>
+          <ac:picMkLst>
+            <pc:docMk/>
+            <pc:sldMk cId="3902976026" sldId="296"/>
+            <ac:picMk id="6" creationId="{0608A728-313C-078D-45F3-F5984CCF7188}"/>
+          </ac:picMkLst>
+        </pc:picChg>
+        <pc:picChg chg="add mod">
+          <ac:chgData name="Andy Lauwers" userId="7be6688b-968b-49c4-9bdf-941ba38dd5c5" providerId="ADAL" clId="{7CABCE64-8FF2-47BE-BDED-1FEAD6D05DA6}" dt="2023-11-21T20:14:39.033" v="249" actId="208"/>
+          <ac:picMkLst>
+            <pc:docMk/>
+            <pc:sldMk cId="3902976026" sldId="296"/>
+            <ac:picMk id="7" creationId="{3EC9C497-A7AD-15BA-287A-A45A8B83A840}"/>
+          </ac:picMkLst>
+        </pc:picChg>
+        <pc:picChg chg="add mod ord modCrop">
+          <ac:chgData name="Andy Lauwers" userId="7be6688b-968b-49c4-9bdf-941ba38dd5c5" providerId="ADAL" clId="{7CABCE64-8FF2-47BE-BDED-1FEAD6D05DA6}" dt="2023-11-21T18:36:02.555" v="230" actId="1076"/>
+          <ac:picMkLst>
+            <pc:docMk/>
+            <pc:sldMk cId="3902976026" sldId="296"/>
+            <ac:picMk id="8" creationId="{C35D74DA-2272-73FF-6064-BE4FF01EFD38}"/>
+          </ac:picMkLst>
+        </pc:picChg>
+        <pc:picChg chg="add mod ord">
+          <ac:chgData name="Andy Lauwers" userId="7be6688b-968b-49c4-9bdf-941ba38dd5c5" providerId="ADAL" clId="{7CABCE64-8FF2-47BE-BDED-1FEAD6D05DA6}" dt="2023-11-21T20:14:33.301" v="247" actId="1582"/>
+          <ac:picMkLst>
+            <pc:docMk/>
+            <pc:sldMk cId="3902976026" sldId="296"/>
+            <ac:picMk id="10" creationId="{4164F6FB-5CE1-EB6B-E416-5557C6B0B504}"/>
+          </ac:picMkLst>
+        </pc:picChg>
+      </pc:sldChg>
+    </pc:docChg>
+  </pc:docChgLst>
+</pc:chgInfo>
+</file>
+
 <file path=ppt/handoutMasters/handoutMaster1.xml><?xml version="1.0" encoding="utf-8"?>
 <p:handoutMaster xmlns:a="http://schemas.openxmlformats.org/drawingml/2006/main" xmlns:r="http://schemas.openxmlformats.org/officeDocument/2006/relationships" xmlns:p="http://schemas.openxmlformats.org/presentationml/2006/main">
   <p:cSld>
@@ -247,7 +467,7 @@
             <a:pPr rtl="0"/>
             <a:fld id="{6BC4ED84-6EAE-4BB9-A239-A4541838CFBF}" type="datetime1">
               <a:rPr lang="fr-FR" smtClean="0"/>
-              <a:t>20/11/2023</a:t>
+              <a:t>21/11/2023</a:t>
             </a:fld>
             <a:endParaRPr lang="fr-FR"/>
           </a:p>
@@ -429,7 +649,7 @@
             <a:fld id="{30AA49DA-9B4C-4C11-AFC5-1C9CC1D3D925}" type="datetime1">
               <a:rPr lang="fr-FR" smtClean="0"/>
               <a:pPr/>
-              <a:t>20/11/2023</a:t>
+              <a:t>21/11/2023</a:t>
             </a:fld>
             <a:endParaRPr lang="fr-FR" dirty="0"/>
           </a:p>
@@ -1193,6 +1413,91 @@
             <a:fld id="{D4B9A9E5-4F7F-4A7D-9DE1-899232329269}" type="slidenum">
               <a:rPr lang="fr-FR" smtClean="0"/>
               <a:t>7</a:t>
+            </a:fld>
+            <a:endParaRPr lang="fr-FR"/>
+          </a:p>
+        </p:txBody>
+      </p:sp>
+    </p:spTree>
+    <p:extLst>
+      <p:ext uri="{BB962C8B-B14F-4D97-AF65-F5344CB8AC3E}">
+        <p14:creationId xmlns:p14="http://schemas.microsoft.com/office/powerpoint/2010/main" val="1981810197"/>
+      </p:ext>
+    </p:extLst>
+  </p:cSld>
+  <p:clrMapOvr>
+    <a:masterClrMapping/>
+  </p:clrMapOvr>
+</p:notes>
+</file>
+
+<file path=ppt/notesSlides/notesSlide7.xml><?xml version="1.0" encoding="utf-8"?>
+<p:notes xmlns:a="http://schemas.openxmlformats.org/drawingml/2006/main" xmlns:r="http://schemas.openxmlformats.org/officeDocument/2006/relationships" xmlns:p="http://schemas.openxmlformats.org/presentationml/2006/main">
+  <p:cSld>
+    <p:spTree>
+      <p:nvGrpSpPr>
+        <p:cNvPr id="1" name=""/>
+        <p:cNvGrpSpPr/>
+        <p:nvPr/>
+      </p:nvGrpSpPr>
+      <p:grpSpPr>
+        <a:xfrm>
+          <a:off x="0" y="0"/>
+          <a:ext cx="0" cy="0"/>
+          <a:chOff x="0" y="0"/>
+          <a:chExt cx="0" cy="0"/>
+        </a:xfrm>
+      </p:grpSpPr>
+      <p:sp>
+        <p:nvSpPr>
+          <p:cNvPr id="2" name="Espace réservé de l'image des diapositives 1"/>
+          <p:cNvSpPr>
+            <a:spLocks noGrp="1" noRot="1" noChangeAspect="1"/>
+          </p:cNvSpPr>
+          <p:nvPr>
+            <p:ph type="sldImg"/>
+          </p:nvPr>
+        </p:nvSpPr>
+        <p:spPr/>
+      </p:sp>
+      <p:sp>
+        <p:nvSpPr>
+          <p:cNvPr id="3" name="Espace réservé des notes 2"/>
+          <p:cNvSpPr>
+            <a:spLocks noGrp="1"/>
+          </p:cNvSpPr>
+          <p:nvPr>
+            <p:ph type="body" idx="1"/>
+          </p:nvPr>
+        </p:nvSpPr>
+        <p:spPr/>
+        <p:txBody>
+          <a:bodyPr/>
+          <a:lstStyle/>
+          <a:p>
+            <a:endParaRPr lang="fr-FR"/>
+          </a:p>
+        </p:txBody>
+      </p:sp>
+      <p:sp>
+        <p:nvSpPr>
+          <p:cNvPr id="4" name="Espace réservé du numéro de diapositive 3"/>
+          <p:cNvSpPr>
+            <a:spLocks noGrp="1"/>
+          </p:cNvSpPr>
+          <p:nvPr>
+            <p:ph type="sldNum" sz="quarter" idx="5"/>
+          </p:nvPr>
+        </p:nvSpPr>
+        <p:spPr/>
+        <p:txBody>
+          <a:bodyPr/>
+          <a:lstStyle/>
+          <a:p>
+            <a:pPr rtl="0"/>
+            <a:fld id="{D4B9A9E5-4F7F-4A7D-9DE1-899232329269}" type="slidenum">
+              <a:rPr lang="fr-FR" smtClean="0"/>
+              <a:t>8</a:t>
             </a:fld>
             <a:endParaRPr lang="fr-FR"/>
           </a:p>
@@ -17832,8 +18137,21 @@
             <a:pPr rtl="0"/>
             <a:r>
               <a:rPr lang="fr-FR" dirty="0"/>
-              <a:t>Post</a:t>
-            </a:r>
+              <a:t>Post </a:t>
+            </a:r>
+            <a:r>
+              <a:rPr lang="fr-FR" dirty="0" err="1"/>
+              <a:t>creëren</a:t>
+            </a:r>
+            <a:r>
+              <a:rPr lang="fr-FR" dirty="0"/>
+              <a:t>, Patch </a:t>
+            </a:r>
+            <a:r>
+              <a:rPr lang="fr-FR" dirty="0" err="1"/>
+              <a:t>creëren</a:t>
+            </a:r>
+            <a:endParaRPr lang="fr-FR" dirty="0"/>
           </a:p>
         </p:txBody>
       </p:sp>
@@ -18219,6 +18537,41 @@
           <a:chExt cx="0" cy="0"/>
         </a:xfrm>
       </p:grpSpPr>
+      <p:pic>
+        <p:nvPicPr>
+          <p:cNvPr id="28" name="Afbeelding 27">
+            <a:extLst>
+              <a:ext uri="{FF2B5EF4-FFF2-40B4-BE49-F238E27FC236}">
+                <a16:creationId xmlns:a16="http://schemas.microsoft.com/office/drawing/2014/main" id="{2487D7EF-2234-73EA-7432-979E8BB95317}"/>
+              </a:ext>
+            </a:extLst>
+          </p:cNvPr>
+          <p:cNvPicPr>
+            <a:picLocks noChangeAspect="1"/>
+          </p:cNvPicPr>
+          <p:nvPr/>
+        </p:nvPicPr>
+        <p:blipFill>
+          <a:blip r:embed="rId3"/>
+          <a:stretch>
+            <a:fillRect/>
+          </a:stretch>
+        </p:blipFill>
+        <p:spPr>
+          <a:xfrm>
+            <a:off x="6944897" y="1714400"/>
+            <a:ext cx="2528993" cy="2420418"/>
+          </a:xfrm>
+          <a:prstGeom prst="rect">
+            <a:avLst/>
+          </a:prstGeom>
+          <a:ln w="28575">
+            <a:solidFill>
+              <a:schemeClr val="tx1"/>
+            </a:solidFill>
+          </a:ln>
+        </p:spPr>
+      </p:pic>
       <p:sp>
         <p:nvSpPr>
           <p:cNvPr id="2" name="Titre 1">
@@ -18237,7 +18590,7 @@
         </p:nvSpPr>
         <p:spPr>
           <a:xfrm>
-            <a:off x="5920169" y="1152771"/>
+            <a:off x="5921828" y="868099"/>
             <a:ext cx="5431971" cy="846301"/>
           </a:xfrm>
         </p:spPr>
@@ -18248,231 +18601,9 @@
             <a:pPr rtl="0"/>
             <a:r>
               <a:rPr lang="fr-FR" dirty="0" err="1"/>
-              <a:t>Back-end</a:t>
+              <a:t>Front-end</a:t>
             </a:r>
             <a:endParaRPr lang="fr-FR" dirty="0"/>
-          </a:p>
-        </p:txBody>
-      </p:sp>
-      <p:sp>
-        <p:nvSpPr>
-          <p:cNvPr id="6" name="Espace réservé du texte 5">
-            <a:extLst>
-              <a:ext uri="{FF2B5EF4-FFF2-40B4-BE49-F238E27FC236}">
-                <a16:creationId xmlns:a16="http://schemas.microsoft.com/office/drawing/2014/main" id="{7640DF9D-0C9E-4C5D-9635-6B4DE10CCEE5}"/>
-              </a:ext>
-            </a:extLst>
-          </p:cNvPr>
-          <p:cNvSpPr>
-            <a:spLocks noGrp="1"/>
-          </p:cNvSpPr>
-          <p:nvPr>
-            <p:ph type="body" sz="quarter" idx="13"/>
-          </p:nvPr>
-        </p:nvSpPr>
-        <p:spPr>
-          <a:xfrm>
-            <a:off x="5922254" y="2469515"/>
-            <a:ext cx="5433204" cy="365125"/>
-          </a:xfrm>
-        </p:spPr>
-        <p:txBody>
-          <a:bodyPr vert="horz" lIns="91440" tIns="45720" rIns="91440" bIns="45720" rtlCol="0" anchor="t">
-            <a:noAutofit/>
-          </a:bodyPr>
-          <a:lstStyle/>
-          <a:p>
-            <a:pPr rtl="0"/>
-            <a:r>
-              <a:rPr lang="fr-FR" noProof="1"/>
-              <a:t>…</a:t>
-            </a:r>
-          </a:p>
-        </p:txBody>
-      </p:sp>
-      <p:sp>
-        <p:nvSpPr>
-          <p:cNvPr id="7" name="Espace réservé du texte 6">
-            <a:extLst>
-              <a:ext uri="{FF2B5EF4-FFF2-40B4-BE49-F238E27FC236}">
-                <a16:creationId xmlns:a16="http://schemas.microsoft.com/office/drawing/2014/main" id="{40297407-CE4E-4284-879D-AEC395713625}"/>
-              </a:ext>
-            </a:extLst>
-          </p:cNvPr>
-          <p:cNvSpPr>
-            <a:spLocks noGrp="1"/>
-          </p:cNvSpPr>
-          <p:nvPr>
-            <p:ph type="body" sz="quarter" idx="15"/>
-          </p:nvPr>
-        </p:nvSpPr>
-        <p:spPr>
-          <a:xfrm>
-            <a:off x="5921828" y="2798940"/>
-            <a:ext cx="5431971" cy="557950"/>
-          </a:xfrm>
-        </p:spPr>
-        <p:txBody>
-          <a:bodyPr rtlCol="0">
-            <a:normAutofit/>
-          </a:bodyPr>
-          <a:lstStyle/>
-          <a:p>
-            <a:pPr rtl="0"/>
-            <a:r>
-              <a:rPr lang="fr-FR" dirty="0"/>
-              <a:t>…</a:t>
-            </a:r>
-          </a:p>
-        </p:txBody>
-      </p:sp>
-      <p:sp>
-        <p:nvSpPr>
-          <p:cNvPr id="8" name="Espace réservé du texte 7">
-            <a:extLst>
-              <a:ext uri="{FF2B5EF4-FFF2-40B4-BE49-F238E27FC236}">
-                <a16:creationId xmlns:a16="http://schemas.microsoft.com/office/drawing/2014/main" id="{F5C3A7BE-F7FC-4942-A31A-491A8A806103}"/>
-              </a:ext>
-            </a:extLst>
-          </p:cNvPr>
-          <p:cNvSpPr>
-            <a:spLocks noGrp="1"/>
-          </p:cNvSpPr>
-          <p:nvPr>
-            <p:ph type="body" sz="quarter" idx="23"/>
-          </p:nvPr>
-        </p:nvSpPr>
-        <p:spPr>
-          <a:xfrm>
-            <a:off x="5922254" y="3569311"/>
-            <a:ext cx="5433204" cy="365125"/>
-          </a:xfrm>
-        </p:spPr>
-        <p:txBody>
-          <a:bodyPr vert="horz" lIns="91440" tIns="45720" rIns="91440" bIns="45720" rtlCol="0" anchor="t">
-            <a:noAutofit/>
-          </a:bodyPr>
-          <a:lstStyle/>
-          <a:p>
-            <a:r>
-              <a:rPr lang="fr-FR" dirty="0"/>
-              <a:t>…</a:t>
-            </a:r>
-          </a:p>
-          <a:p>
-            <a:pPr rtl="0"/>
-            <a:endParaRPr lang="fr-FR" noProof="1"/>
-          </a:p>
-        </p:txBody>
-      </p:sp>
-      <p:sp>
-        <p:nvSpPr>
-          <p:cNvPr id="9" name="Espace réservé du texte 8">
-            <a:extLst>
-              <a:ext uri="{FF2B5EF4-FFF2-40B4-BE49-F238E27FC236}">
-                <a16:creationId xmlns:a16="http://schemas.microsoft.com/office/drawing/2014/main" id="{95CCE699-03D1-4642-B46A-B14EF17DA183}"/>
-              </a:ext>
-            </a:extLst>
-          </p:cNvPr>
-          <p:cNvSpPr>
-            <a:spLocks noGrp="1"/>
-          </p:cNvSpPr>
-          <p:nvPr>
-            <p:ph type="body" sz="quarter" idx="24"/>
-          </p:nvPr>
-        </p:nvSpPr>
-        <p:spPr>
-          <a:xfrm>
-            <a:off x="5921828" y="3898736"/>
-            <a:ext cx="5431971" cy="557950"/>
-          </a:xfrm>
-        </p:spPr>
-        <p:txBody>
-          <a:bodyPr rtlCol="0">
-            <a:normAutofit/>
-          </a:bodyPr>
-          <a:lstStyle/>
-          <a:p>
-            <a:pPr rtl="0"/>
-            <a:r>
-              <a:rPr lang="fr-FR" dirty="0"/>
-              <a:t>…</a:t>
-            </a:r>
-          </a:p>
-        </p:txBody>
-      </p:sp>
-      <p:sp>
-        <p:nvSpPr>
-          <p:cNvPr id="10" name="Espace réservé du texte 9">
-            <a:extLst>
-              <a:ext uri="{FF2B5EF4-FFF2-40B4-BE49-F238E27FC236}">
-                <a16:creationId xmlns:a16="http://schemas.microsoft.com/office/drawing/2014/main" id="{BC1DF189-6F2F-4C21-88CC-C82D3D0D147B}"/>
-              </a:ext>
-            </a:extLst>
-          </p:cNvPr>
-          <p:cNvSpPr>
-            <a:spLocks noGrp="1"/>
-          </p:cNvSpPr>
-          <p:nvPr>
-            <p:ph type="body" sz="quarter" idx="25"/>
-          </p:nvPr>
-        </p:nvSpPr>
-        <p:spPr>
-          <a:xfrm>
-            <a:off x="5922254" y="4669107"/>
-            <a:ext cx="5433204" cy="365125"/>
-          </a:xfrm>
-        </p:spPr>
-        <p:txBody>
-          <a:bodyPr vert="horz" lIns="91440" tIns="45720" rIns="91440" bIns="45720" rtlCol="0" anchor="t">
-            <a:normAutofit lnSpcReduction="10000"/>
-          </a:bodyPr>
-          <a:lstStyle/>
-          <a:p>
-            <a:r>
-              <a:rPr lang="fr-FR" dirty="0"/>
-              <a:t>…</a:t>
-            </a:r>
-          </a:p>
-          <a:p>
-            <a:pPr rtl="0"/>
-            <a:endParaRPr lang="fr-FR" noProof="1"/>
-          </a:p>
-        </p:txBody>
-      </p:sp>
-      <p:sp>
-        <p:nvSpPr>
-          <p:cNvPr id="5" name="Espace réservé du texte 4">
-            <a:extLst>
-              <a:ext uri="{FF2B5EF4-FFF2-40B4-BE49-F238E27FC236}">
-                <a16:creationId xmlns:a16="http://schemas.microsoft.com/office/drawing/2014/main" id="{06E82690-B145-4D4F-B2D1-0B2A8C50FD71}"/>
-              </a:ext>
-            </a:extLst>
-          </p:cNvPr>
-          <p:cNvSpPr>
-            <a:spLocks noGrp="1"/>
-          </p:cNvSpPr>
-          <p:nvPr>
-            <p:ph type="body" sz="quarter" idx="26"/>
-          </p:nvPr>
-        </p:nvSpPr>
-        <p:spPr>
-          <a:xfrm>
-            <a:off x="5921828" y="4998532"/>
-            <a:ext cx="5431971" cy="557950"/>
-          </a:xfrm>
-        </p:spPr>
-        <p:txBody>
-          <a:bodyPr rtlCol="0">
-            <a:normAutofit/>
-          </a:bodyPr>
-          <a:lstStyle/>
-          <a:p>
-            <a:pPr rtl="0"/>
-            <a:r>
-              <a:rPr lang="fr-FR" dirty="0"/>
-              <a:t>…</a:t>
-            </a:r>
           </a:p>
         </p:txBody>
       </p:sp>
@@ -18589,6 +18720,111 @@
           </a:p>
         </p:txBody>
       </p:sp>
+      <p:pic>
+        <p:nvPicPr>
+          <p:cNvPr id="24" name="Afbeelding 23">
+            <a:extLst>
+              <a:ext uri="{FF2B5EF4-FFF2-40B4-BE49-F238E27FC236}">
+                <a16:creationId xmlns:a16="http://schemas.microsoft.com/office/drawing/2014/main" id="{FDAE47D6-4D84-7AC5-04EA-F74F0580CBC2}"/>
+              </a:ext>
+            </a:extLst>
+          </p:cNvPr>
+          <p:cNvPicPr>
+            <a:picLocks noChangeAspect="1"/>
+          </p:cNvPicPr>
+          <p:nvPr/>
+        </p:nvPicPr>
+        <p:blipFill>
+          <a:blip r:embed="rId4"/>
+          <a:stretch>
+            <a:fillRect/>
+          </a:stretch>
+        </p:blipFill>
+        <p:spPr>
+          <a:xfrm>
+            <a:off x="3284141" y="1714400"/>
+            <a:ext cx="2534164" cy="2420418"/>
+          </a:xfrm>
+          <a:prstGeom prst="rect">
+            <a:avLst/>
+          </a:prstGeom>
+          <a:ln w="28575">
+            <a:solidFill>
+              <a:schemeClr val="tx1"/>
+            </a:solidFill>
+          </a:ln>
+        </p:spPr>
+      </p:pic>
+      <p:pic>
+        <p:nvPicPr>
+          <p:cNvPr id="30" name="Afbeelding 29">
+            <a:extLst>
+              <a:ext uri="{FF2B5EF4-FFF2-40B4-BE49-F238E27FC236}">
+                <a16:creationId xmlns:a16="http://schemas.microsoft.com/office/drawing/2014/main" id="{5ACB98AD-DF61-F169-376E-311211CCA5A2}"/>
+              </a:ext>
+            </a:extLst>
+          </p:cNvPr>
+          <p:cNvPicPr>
+            <a:picLocks noChangeAspect="1"/>
+          </p:cNvPicPr>
+          <p:nvPr/>
+        </p:nvPicPr>
+        <p:blipFill>
+          <a:blip r:embed="rId5"/>
+          <a:stretch>
+            <a:fillRect/>
+          </a:stretch>
+        </p:blipFill>
+        <p:spPr>
+          <a:xfrm>
+            <a:off x="8783926" y="3789237"/>
+            <a:ext cx="2547948" cy="2420418"/>
+          </a:xfrm>
+          <a:prstGeom prst="rect">
+            <a:avLst/>
+          </a:prstGeom>
+          <a:ln w="28575">
+            <a:solidFill>
+              <a:schemeClr val="tx1"/>
+            </a:solidFill>
+          </a:ln>
+        </p:spPr>
+      </p:pic>
+      <p:pic>
+        <p:nvPicPr>
+          <p:cNvPr id="26" name="Afbeelding 25">
+            <a:extLst>
+              <a:ext uri="{FF2B5EF4-FFF2-40B4-BE49-F238E27FC236}">
+                <a16:creationId xmlns:a16="http://schemas.microsoft.com/office/drawing/2014/main" id="{39A2A588-D1A0-B1D5-885C-B131B230C2A9}"/>
+              </a:ext>
+            </a:extLst>
+          </p:cNvPr>
+          <p:cNvPicPr>
+            <a:picLocks noChangeAspect="1"/>
+          </p:cNvPicPr>
+          <p:nvPr/>
+        </p:nvPicPr>
+        <p:blipFill>
+          <a:blip r:embed="rId6"/>
+          <a:stretch>
+            <a:fillRect/>
+          </a:stretch>
+        </p:blipFill>
+        <p:spPr>
+          <a:xfrm>
+            <a:off x="5129541" y="3789237"/>
+            <a:ext cx="2527793" cy="2398770"/>
+          </a:xfrm>
+          <a:prstGeom prst="rect">
+            <a:avLst/>
+          </a:prstGeom>
+          <a:ln w="28575">
+            <a:solidFill>
+              <a:schemeClr val="tx1"/>
+            </a:solidFill>
+          </a:ln>
+        </p:spPr>
+      </p:pic>
     </p:spTree>
     <p:extLst>
       <p:ext uri="{BB962C8B-B14F-4D97-AF65-F5344CB8AC3E}">
@@ -18619,6 +18855,330 @@
           <a:chExt cx="0" cy="0"/>
         </a:xfrm>
       </p:grpSpPr>
+      <p:pic>
+        <p:nvPicPr>
+          <p:cNvPr id="10" name="Afbeelding 9">
+            <a:extLst>
+              <a:ext uri="{FF2B5EF4-FFF2-40B4-BE49-F238E27FC236}">
+                <a16:creationId xmlns:a16="http://schemas.microsoft.com/office/drawing/2014/main" id="{4164F6FB-5CE1-EB6B-E416-5557C6B0B504}"/>
+              </a:ext>
+            </a:extLst>
+          </p:cNvPr>
+          <p:cNvPicPr>
+            <a:picLocks noChangeAspect="1"/>
+          </p:cNvPicPr>
+          <p:nvPr/>
+        </p:nvPicPr>
+        <p:blipFill>
+          <a:blip r:embed="rId3"/>
+          <a:stretch>
+            <a:fillRect/>
+          </a:stretch>
+        </p:blipFill>
+        <p:spPr>
+          <a:xfrm>
+            <a:off x="5484915" y="1325243"/>
+            <a:ext cx="3596992" cy="2833846"/>
+          </a:xfrm>
+          <a:prstGeom prst="rect">
+            <a:avLst/>
+          </a:prstGeom>
+          <a:ln w="28575">
+            <a:solidFill>
+              <a:schemeClr val="bg1"/>
+            </a:solidFill>
+          </a:ln>
+        </p:spPr>
+      </p:pic>
+      <p:pic>
+        <p:nvPicPr>
+          <p:cNvPr id="8" name="Afbeelding 7">
+            <a:extLst>
+              <a:ext uri="{FF2B5EF4-FFF2-40B4-BE49-F238E27FC236}">
+                <a16:creationId xmlns:a16="http://schemas.microsoft.com/office/drawing/2014/main" id="{C35D74DA-2272-73FF-6064-BE4FF01EFD38}"/>
+              </a:ext>
+            </a:extLst>
+          </p:cNvPr>
+          <p:cNvPicPr>
+            <a:picLocks noChangeAspect="1"/>
+          </p:cNvPicPr>
+          <p:nvPr/>
+        </p:nvPicPr>
+        <p:blipFill rotWithShape="1">
+          <a:blip r:embed="rId4"/>
+          <a:srcRect t="17736" r="9074" b="12533"/>
+          <a:stretch/>
+        </p:blipFill>
+        <p:spPr>
+          <a:xfrm>
+            <a:off x="3264607" y="3029436"/>
+            <a:ext cx="2065032" cy="3326914"/>
+          </a:xfrm>
+          <a:prstGeom prst="rect">
+            <a:avLst/>
+          </a:prstGeom>
+          <a:ln w="28575">
+            <a:solidFill>
+              <a:schemeClr val="tx1"/>
+            </a:solidFill>
+          </a:ln>
+        </p:spPr>
+      </p:pic>
+      <p:sp>
+        <p:nvSpPr>
+          <p:cNvPr id="2" name="Titre 1">
+            <a:extLst>
+              <a:ext uri="{FF2B5EF4-FFF2-40B4-BE49-F238E27FC236}">
+                <a16:creationId xmlns:a16="http://schemas.microsoft.com/office/drawing/2014/main" id="{8A4E0A63-A388-49B1-A04E-27CE9BD622EF}"/>
+              </a:ext>
+            </a:extLst>
+          </p:cNvPr>
+          <p:cNvSpPr>
+            <a:spLocks noGrp="1"/>
+          </p:cNvSpPr>
+          <p:nvPr>
+            <p:ph type="title"/>
+          </p:nvPr>
+        </p:nvSpPr>
+        <p:spPr>
+          <a:xfrm>
+            <a:off x="5919680" y="859474"/>
+            <a:ext cx="5431971" cy="846301"/>
+          </a:xfrm>
+        </p:spPr>
+        <p:txBody>
+          <a:bodyPr rtlCol="0"/>
+          <a:lstStyle/>
+          <a:p>
+            <a:pPr rtl="0"/>
+            <a:r>
+              <a:rPr lang="fr-FR" dirty="0" err="1"/>
+              <a:t>Back-end</a:t>
+            </a:r>
+            <a:r>
+              <a:rPr lang="fr-FR" dirty="0"/>
+              <a:t> en </a:t>
+            </a:r>
+            <a:r>
+              <a:rPr lang="fr-FR" dirty="0" err="1"/>
+              <a:t>Databank</a:t>
+            </a:r>
+            <a:endParaRPr lang="fr-FR" dirty="0"/>
+          </a:p>
+        </p:txBody>
+      </p:sp>
+      <p:sp>
+        <p:nvSpPr>
+          <p:cNvPr id="32" name="Espace réservé de la date 31">
+            <a:extLst>
+              <a:ext uri="{FF2B5EF4-FFF2-40B4-BE49-F238E27FC236}">
+                <a16:creationId xmlns:a16="http://schemas.microsoft.com/office/drawing/2014/main" id="{D5DB19F8-B538-4965-BA90-ED372B99F5DC}"/>
+              </a:ext>
+            </a:extLst>
+          </p:cNvPr>
+          <p:cNvSpPr>
+            <a:spLocks noGrp="1"/>
+          </p:cNvSpPr>
+          <p:nvPr>
+            <p:ph type="dt" sz="half" idx="20"/>
+          </p:nvPr>
+        </p:nvSpPr>
+        <p:spPr>
+          <a:xfrm>
+            <a:off x="5919680" y="6356350"/>
+            <a:ext cx="947516" cy="365125"/>
+          </a:xfrm>
+        </p:spPr>
+        <p:txBody>
+          <a:bodyPr rtlCol="0"/>
+          <a:lstStyle/>
+          <a:p>
+            <a:pPr rtl="0"/>
+            <a:r>
+              <a:rPr lang="fr-FR" dirty="0"/>
+              <a:t>2023</a:t>
+            </a:r>
+          </a:p>
+        </p:txBody>
+      </p:sp>
+      <p:sp>
+        <p:nvSpPr>
+          <p:cNvPr id="3" name="Espace réservé du pied de page 2">
+            <a:extLst>
+              <a:ext uri="{FF2B5EF4-FFF2-40B4-BE49-F238E27FC236}">
+                <a16:creationId xmlns:a16="http://schemas.microsoft.com/office/drawing/2014/main" id="{005C44B1-BA82-483C-BD91-F89067442F9E}"/>
+              </a:ext>
+            </a:extLst>
+          </p:cNvPr>
+          <p:cNvSpPr>
+            <a:spLocks noGrp="1"/>
+          </p:cNvSpPr>
+          <p:nvPr>
+            <p:ph type="ftr" sz="quarter" idx="21"/>
+          </p:nvPr>
+        </p:nvSpPr>
+        <p:spPr>
+          <a:xfrm>
+            <a:off x="7161955" y="6356350"/>
+            <a:ext cx="3243942" cy="365125"/>
+          </a:xfrm>
+        </p:spPr>
+        <p:txBody>
+          <a:bodyPr rtlCol="0"/>
+          <a:lstStyle/>
+          <a:p>
+            <a:pPr rtl="0"/>
+            <a:r>
+              <a:rPr lang="fr-FR" noProof="0" dirty="0" err="1"/>
+              <a:t>Fleetmanager</a:t>
+            </a:r>
+            <a:r>
+              <a:rPr lang="fr-FR" noProof="0" dirty="0"/>
+              <a:t> </a:t>
+            </a:r>
+            <a:r>
+              <a:rPr lang="fr-FR" noProof="0" dirty="0" err="1"/>
+              <a:t>Allphi</a:t>
+            </a:r>
+            <a:endParaRPr lang="fr-FR" noProof="0" dirty="0"/>
+          </a:p>
+        </p:txBody>
+      </p:sp>
+      <p:sp>
+        <p:nvSpPr>
+          <p:cNvPr id="4" name="Espace réservé du numéro de diapositive 3">
+            <a:extLst>
+              <a:ext uri="{FF2B5EF4-FFF2-40B4-BE49-F238E27FC236}">
+                <a16:creationId xmlns:a16="http://schemas.microsoft.com/office/drawing/2014/main" id="{79ED4A67-3A46-4F54-A12A-EAE1B53E6457}"/>
+              </a:ext>
+            </a:extLst>
+          </p:cNvPr>
+          <p:cNvSpPr>
+            <a:spLocks noGrp="1"/>
+          </p:cNvSpPr>
+          <p:nvPr>
+            <p:ph type="sldNum" sz="quarter" idx="22"/>
+          </p:nvPr>
+        </p:nvSpPr>
+        <p:spPr>
+          <a:xfrm>
+            <a:off x="10700656" y="6356350"/>
+            <a:ext cx="653143" cy="365125"/>
+          </a:xfrm>
+        </p:spPr>
+        <p:txBody>
+          <a:bodyPr rtlCol="0"/>
+          <a:lstStyle/>
+          <a:p>
+            <a:pPr rtl="0"/>
+            <a:fld id="{19B51A1E-902D-48AF-9020-955120F399B6}" type="slidenum">
+              <a:rPr lang="fr-FR" smtClean="0"/>
+              <a:pPr rtl="0"/>
+              <a:t>7</a:t>
+            </a:fld>
+            <a:endParaRPr lang="fr-FR" dirty="0"/>
+          </a:p>
+        </p:txBody>
+      </p:sp>
+      <p:pic>
+        <p:nvPicPr>
+          <p:cNvPr id="6" name="Afbeelding 5">
+            <a:extLst>
+              <a:ext uri="{FF2B5EF4-FFF2-40B4-BE49-F238E27FC236}">
+                <a16:creationId xmlns:a16="http://schemas.microsoft.com/office/drawing/2014/main" id="{0608A728-313C-078D-45F3-F5984CCF7188}"/>
+              </a:ext>
+            </a:extLst>
+          </p:cNvPr>
+          <p:cNvPicPr>
+            <a:picLocks noChangeAspect="1"/>
+          </p:cNvPicPr>
+          <p:nvPr/>
+        </p:nvPicPr>
+        <p:blipFill rotWithShape="1">
+          <a:blip r:embed="rId5"/>
+          <a:srcRect t="17103" r="3249" b="13079"/>
+          <a:stretch/>
+        </p:blipFill>
+        <p:spPr>
+          <a:xfrm>
+            <a:off x="1394149" y="1325243"/>
+            <a:ext cx="2065032" cy="3326914"/>
+          </a:xfrm>
+          <a:prstGeom prst="rect">
+            <a:avLst/>
+          </a:prstGeom>
+          <a:ln w="28575">
+            <a:solidFill>
+              <a:schemeClr val="tx1"/>
+            </a:solidFill>
+          </a:ln>
+        </p:spPr>
+      </p:pic>
+      <p:pic>
+        <p:nvPicPr>
+          <p:cNvPr id="7" name="Afbeelding 6">
+            <a:extLst>
+              <a:ext uri="{FF2B5EF4-FFF2-40B4-BE49-F238E27FC236}">
+                <a16:creationId xmlns:a16="http://schemas.microsoft.com/office/drawing/2014/main" id="{3EC9C497-A7AD-15BA-287A-A45A8B83A840}"/>
+              </a:ext>
+            </a:extLst>
+          </p:cNvPr>
+          <p:cNvPicPr>
+            <a:picLocks noChangeAspect="1"/>
+          </p:cNvPicPr>
+          <p:nvPr/>
+        </p:nvPicPr>
+        <p:blipFill>
+          <a:blip r:embed="rId6"/>
+          <a:stretch>
+            <a:fillRect/>
+          </a:stretch>
+        </p:blipFill>
+        <p:spPr>
+          <a:xfrm>
+            <a:off x="7578170" y="3318476"/>
+            <a:ext cx="3596992" cy="3037874"/>
+          </a:xfrm>
+          <a:prstGeom prst="rect">
+            <a:avLst/>
+          </a:prstGeom>
+          <a:ln w="28575">
+            <a:solidFill>
+              <a:schemeClr val="bg1"/>
+            </a:solidFill>
+          </a:ln>
+        </p:spPr>
+      </p:pic>
+    </p:spTree>
+    <p:extLst>
+      <p:ext uri="{BB962C8B-B14F-4D97-AF65-F5344CB8AC3E}">
+        <p14:creationId xmlns:p14="http://schemas.microsoft.com/office/powerpoint/2010/main" val="3902976026"/>
+      </p:ext>
+    </p:extLst>
+  </p:cSld>
+  <p:clrMapOvr>
+    <a:masterClrMapping/>
+  </p:clrMapOvr>
+</p:sld>
+</file>
+
+<file path=ppt/slides/slide8.xml><?xml version="1.0" encoding="utf-8"?>
+<p:sld xmlns:a="http://schemas.openxmlformats.org/drawingml/2006/main" xmlns:r="http://schemas.openxmlformats.org/officeDocument/2006/relationships" xmlns:p="http://schemas.openxmlformats.org/presentationml/2006/main">
+  <p:cSld>
+    <p:spTree>
+      <p:nvGrpSpPr>
+        <p:cNvPr id="1" name=""/>
+        <p:cNvGrpSpPr/>
+        <p:nvPr/>
+      </p:nvGrpSpPr>
+      <p:grpSpPr>
+        <a:xfrm>
+          <a:off x="0" y="0"/>
+          <a:ext cx="0" cy="0"/>
+          <a:chOff x="0" y="0"/>
+          <a:chExt cx="0" cy="0"/>
+        </a:xfrm>
+      </p:grpSpPr>
       <p:sp>
         <p:nvSpPr>
           <p:cNvPr id="2" name="Titre 1">
@@ -18761,7 +19321,7 @@
             <a:fld id="{B5CEABB6-07DC-46E8-9B57-56EC44A396E5}" type="slidenum">
               <a:rPr lang="fr-FR" smtClean="0"/>
               <a:pPr rtl="0"/>
-              <a:t>7</a:t>
+              <a:t>8</a:t>
             </a:fld>
             <a:endParaRPr lang="fr-FR"/>
           </a:p>
@@ -18780,7 +19340,7 @@
 </p:sld>
 </file>
 
-<file path=ppt/slides/slide8.xml><?xml version="1.0" encoding="utf-8"?>
+<file path=ppt/slides/slide9.xml><?xml version="1.0" encoding="utf-8"?>
 <p:sld xmlns:a="http://schemas.openxmlformats.org/drawingml/2006/main" xmlns:r="http://schemas.openxmlformats.org/officeDocument/2006/relationships" xmlns:p="http://schemas.openxmlformats.org/presentationml/2006/main">
   <p:cSld>
     <p:spTree>
@@ -19919,6 +20479,25 @@
 </file>
 
 <file path=customXml/item1.xml><?xml version="1.0" encoding="utf-8"?>
+<p:properties xmlns:p="http://schemas.microsoft.com/office/2006/metadata/properties" xmlns:xsi="http://www.w3.org/2001/XMLSchema-instance" xmlns:pc="http://schemas.microsoft.com/office/infopath/2007/PartnerControls">
+  <documentManagement>
+    <_ip_UnifiedCompliancePolicyUIAction xmlns="http://schemas.microsoft.com/sharepoint/v3" xsi:nil="true"/>
+    <Image xmlns="71af3243-3dd4-4a8d-8c0d-dd76da1f02a5">
+      <Url xsi:nil="true"/>
+      <Description xsi:nil="true"/>
+    </Image>
+    <Status xmlns="71af3243-3dd4-4a8d-8c0d-dd76da1f02a5">Not started</Status>
+    <_ip_UnifiedCompliancePolicyProperties xmlns="http://schemas.microsoft.com/sharepoint/v3" xsi:nil="true"/>
+    <ImageTagsTaxHTField xmlns="71af3243-3dd4-4a8d-8c0d-dd76da1f02a5">
+      <Terms xmlns="http://schemas.microsoft.com/office/infopath/2007/PartnerControls"/>
+    </ImageTagsTaxHTField>
+    <TaxCatchAll xmlns="230e9df3-be65-4c73-a93b-d1236ebd677e"/>
+    <MediaServiceKeyPoints xmlns="71af3243-3dd4-4a8d-8c0d-dd76da1f02a5" xsi:nil="true"/>
+  </documentManagement>
+</p:properties>
+</file>
+
+<file path=customXml/item2.xml><?xml version="1.0" encoding="utf-8"?>
 <?mso-contentType ?>
 <FormTemplates xmlns="http://schemas.microsoft.com/sharepoint/v3/contenttype/forms">
   <Display>DocumentLibraryForm</Display>
@@ -19927,7 +20506,7 @@
 </FormTemplates>
 </file>
 
-<file path=customXml/item2.xml><?xml version="1.0" encoding="utf-8"?>
+<file path=customXml/item3.xml><?xml version="1.0" encoding="utf-8"?>
 <ct:contentTypeSchema xmlns:ct="http://schemas.microsoft.com/office/2006/metadata/contentType" xmlns:ma="http://schemas.microsoft.com/office/2006/metadata/properties/metaAttributes" ct:_="" ma:_="" ma:contentTypeName="Document" ma:contentTypeID="0x01010079F111ED35F8CC479449609E8A0923A6" ma:contentTypeVersion="20" ma:contentTypeDescription="Create a new document." ma:contentTypeScope="" ma:versionID="1267097ee5f5874adfcc408041ae252e">
   <xsd:schema xmlns:xsd="http://www.w3.org/2001/XMLSchema" xmlns:xs="http://www.w3.org/2001/XMLSchema" xmlns:p="http://schemas.microsoft.com/office/2006/metadata/properties" xmlns:ns1="http://schemas.microsoft.com/sharepoint/v3" xmlns:ns2="71af3243-3dd4-4a8d-8c0d-dd76da1f02a5" xmlns:ns3="16c05727-aa75-4e4a-9b5f-8a80a1165891" xmlns:ns4="230e9df3-be65-4c73-a93b-d1236ebd677e" targetNamespace="http://schemas.microsoft.com/office/2006/metadata/properties" ma:root="true" ma:fieldsID="395891a93df65b14727750f2c06c306c" ns1:_="" ns2:_="" ns3:_="" ns4:_="">
     <xsd:import namespace="http://schemas.microsoft.com/sharepoint/v3"/>
@@ -20203,26 +20782,19 @@
 </ct:contentTypeSchema>
 </file>
 
-<file path=customXml/item3.xml><?xml version="1.0" encoding="utf-8"?>
-<p:properties xmlns:p="http://schemas.microsoft.com/office/2006/metadata/properties" xmlns:xsi="http://www.w3.org/2001/XMLSchema-instance" xmlns:pc="http://schemas.microsoft.com/office/infopath/2007/PartnerControls">
-  <documentManagement>
-    <_ip_UnifiedCompliancePolicyUIAction xmlns="http://schemas.microsoft.com/sharepoint/v3" xsi:nil="true"/>
-    <Image xmlns="71af3243-3dd4-4a8d-8c0d-dd76da1f02a5">
-      <Url xsi:nil="true"/>
-      <Description xsi:nil="true"/>
-    </Image>
-    <Status xmlns="71af3243-3dd4-4a8d-8c0d-dd76da1f02a5">Not started</Status>
-    <_ip_UnifiedCompliancePolicyProperties xmlns="http://schemas.microsoft.com/sharepoint/v3" xsi:nil="true"/>
-    <ImageTagsTaxHTField xmlns="71af3243-3dd4-4a8d-8c0d-dd76da1f02a5">
-      <Terms xmlns="http://schemas.microsoft.com/office/infopath/2007/PartnerControls"/>
-    </ImageTagsTaxHTField>
-    <TaxCatchAll xmlns="230e9df3-be65-4c73-a93b-d1236ebd677e"/>
-    <MediaServiceKeyPoints xmlns="71af3243-3dd4-4a8d-8c0d-dd76da1f02a5" xsi:nil="true"/>
-  </documentManagement>
-</p:properties>
+<file path=customXml/itemProps1.xml><?xml version="1.0" encoding="utf-8"?>
+<ds:datastoreItem xmlns:ds="http://schemas.openxmlformats.org/officeDocument/2006/customXml" ds:itemID="{B5BA3906-9696-4247-AC0D-DD5C26B2A70A}">
+  <ds:schemaRefs>
+    <ds:schemaRef ds:uri="http://schemas.microsoft.com/office/2006/metadata/properties"/>
+    <ds:schemaRef ds:uri="http://schemas.microsoft.com/office/infopath/2007/PartnerControls"/>
+    <ds:schemaRef ds:uri="http://schemas.microsoft.com/sharepoint/v3"/>
+    <ds:schemaRef ds:uri="71af3243-3dd4-4a8d-8c0d-dd76da1f02a5"/>
+    <ds:schemaRef ds:uri="230e9df3-be65-4c73-a93b-d1236ebd677e"/>
+  </ds:schemaRefs>
+</ds:datastoreItem>
 </file>
 
-<file path=customXml/itemProps1.xml><?xml version="1.0" encoding="utf-8"?>
+<file path=customXml/itemProps2.xml><?xml version="1.0" encoding="utf-8"?>
 <ds:datastoreItem xmlns:ds="http://schemas.openxmlformats.org/officeDocument/2006/customXml" ds:itemID="{2D446390-8521-40A2-A462-EA068123BED9}">
   <ds:schemaRefs>
     <ds:schemaRef ds:uri="http://schemas.microsoft.com/sharepoint/v3/contenttype/forms"/>
@@ -20230,7 +20802,7 @@
 </ds:datastoreItem>
 </file>
 
-<file path=customXml/itemProps2.xml><?xml version="1.0" encoding="utf-8"?>
+<file path=customXml/itemProps3.xml><?xml version="1.0" encoding="utf-8"?>
 <ds:datastoreItem xmlns:ds="http://schemas.openxmlformats.org/officeDocument/2006/customXml" ds:itemID="{01E84A1C-2814-43A7-9448-348326113A45}">
   <ds:schemaRefs>
     <ds:schemaRef ds:uri="http://schemas.microsoft.com/office/2006/metadata/contentType"/>
@@ -20251,18 +20823,6 @@
 </ds:datastoreItem>
 </file>
 
-<file path=customXml/itemProps3.xml><?xml version="1.0" encoding="utf-8"?>
-<ds:datastoreItem xmlns:ds="http://schemas.openxmlformats.org/officeDocument/2006/customXml" ds:itemID="{B5BA3906-9696-4247-AC0D-DD5C26B2A70A}">
-  <ds:schemaRefs>
-    <ds:schemaRef ds:uri="http://schemas.microsoft.com/office/2006/metadata/properties"/>
-    <ds:schemaRef ds:uri="http://schemas.microsoft.com/office/infopath/2007/PartnerControls"/>
-    <ds:schemaRef ds:uri="http://schemas.microsoft.com/sharepoint/v3"/>
-    <ds:schemaRef ds:uri="71af3243-3dd4-4a8d-8c0d-dd76da1f02a5"/>
-    <ds:schemaRef ds:uri="230e9df3-be65-4c73-a93b-d1236ebd677e"/>
-  </ds:schemaRefs>
-</ds:datastoreItem>
-</file>
-
 <file path=docMetadata/LabelInfo.xml><?xml version="1.0" encoding="utf-8"?>
 <clbl:labelList xmlns:clbl="http://schemas.microsoft.com/office/2020/mipLabelMetadata">
   <clbl:label id="{f42aa342-8706-4288-bd11-ebb85995028c}" enabled="1" method="Standard" siteId="{72f988bf-86f1-41af-91ab-2d7cd011db47}" removed="0"/>

</xml_diff>